<commit_message>
Final version of PPP
</commit_message>
<xml_diff>
--- a/presentation/Final/Final.pptx
+++ b/presentation/Final/Final.pptx
@@ -5,7 +5,7 @@
     <p:sldMasterId id="2147483684" r:id="rId1"/>
   </p:sldMasterIdLst>
   <p:notesMasterIdLst>
-    <p:notesMasterId r:id="rId29"/>
+    <p:notesMasterId r:id="rId32"/>
   </p:notesMasterIdLst>
   <p:sldIdLst>
     <p:sldId id="256" r:id="rId2"/>
@@ -33,8 +33,11 @@
     <p:sldId id="295" r:id="rId24"/>
     <p:sldId id="263" r:id="rId25"/>
     <p:sldId id="268" r:id="rId26"/>
-    <p:sldId id="277" r:id="rId27"/>
-    <p:sldId id="282" r:id="rId28"/>
+    <p:sldId id="296" r:id="rId27"/>
+    <p:sldId id="277" r:id="rId28"/>
+    <p:sldId id="282" r:id="rId29"/>
+    <p:sldId id="297" r:id="rId30"/>
+    <p:sldId id="298" r:id="rId31"/>
   </p:sldIdLst>
   <p:sldSz cx="12192000" cy="6858000"/>
   <p:notesSz cx="6858000" cy="9144000"/>
@@ -135,7 +138,7 @@
   </p:defaultTextStyle>
   <p:extLst>
     <p:ext uri="{EFAFB233-063F-42B5-8137-9DF3F51BA10A}">
-      <p15:sldGuideLst xmlns="" xmlns:p15="http://schemas.microsoft.com/office/powerpoint/2012/main">
+      <p15:sldGuideLst xmlns:p15="http://schemas.microsoft.com/office/powerpoint/2012/main">
         <p15:guide id="1" orient="horz" pos="2160">
           <p15:clr>
             <a:srgbClr val="A4A3A4"/>
@@ -153,7 +156,7 @@
 </file>
 
 <file path=ppt/charts/chart1.xml><?xml version="1.0" encoding="utf-8"?>
-<c:chartSpace xmlns:c="http://schemas.openxmlformats.org/drawingml/2006/chart" xmlns:a="http://schemas.openxmlformats.org/drawingml/2006/main" xmlns:r="http://schemas.openxmlformats.org/officeDocument/2006/relationships">
+<c:chartSpace xmlns:c="http://schemas.openxmlformats.org/drawingml/2006/chart" xmlns:a="http://schemas.openxmlformats.org/drawingml/2006/main" xmlns:r="http://schemas.openxmlformats.org/officeDocument/2006/relationships" xmlns:c16r2="http://schemas.microsoft.com/office/drawing/2015/06/chart">
   <c:date1904 val="0"/>
   <c:lang val="de-DE"/>
   <c:roundedCorners val="0"/>
@@ -201,7 +204,7 @@
               </c:spPr>
             </c:marker>
             <c:bubble3D val="0"/>
-            <c:extLst xmlns:c16r2="http://schemas.microsoft.com/office/drawing/2015/06/chart">
+            <c:extLst>
               <c:ext xmlns:c16="http://schemas.microsoft.com/office/drawing/2014/chart" uri="{C3380CC4-5D6E-409C-BE32-E72D297353CC}">
                 <c16:uniqueId val="{00000002-1185-4C1A-B1A4-BC1C676DBECF}"/>
               </c:ext>
@@ -217,7 +220,7 @@
               </c:spPr>
             </c:marker>
             <c:bubble3D val="0"/>
-            <c:extLst xmlns:c16r2="http://schemas.microsoft.com/office/drawing/2015/06/chart">
+            <c:extLst>
               <c:ext xmlns:c16="http://schemas.microsoft.com/office/drawing/2014/chart" uri="{C3380CC4-5D6E-409C-BE32-E72D297353CC}">
                 <c16:uniqueId val="{00000001-1185-4C1A-B1A4-BC1C676DBECF}"/>
               </c:ext>
@@ -233,7 +236,7 @@
               </c:spPr>
             </c:marker>
             <c:bubble3D val="0"/>
-            <c:extLst xmlns:c16r2="http://schemas.microsoft.com/office/drawing/2015/06/chart">
+            <c:extLst>
               <c:ext xmlns:c16="http://schemas.microsoft.com/office/drawing/2014/chart" uri="{C3380CC4-5D6E-409C-BE32-E72D297353CC}">
                 <c16:uniqueId val="{00000000-1185-4C1A-B1A4-BC1C676DBECF}"/>
               </c:ext>
@@ -302,7 +305,7 @@
             </c:numRef>
           </c:yVal>
           <c:smooth val="0"/>
-          <c:extLst xmlns:c16r2="http://schemas.microsoft.com/office/drawing/2015/06/chart">
+          <c:extLst>
             <c:ext xmlns:c16="http://schemas.microsoft.com/office/drawing/2014/chart" uri="{C3380CC4-5D6E-409C-BE32-E72D297353CC}">
               <c16:uniqueId val="{00000000-684E-462E-B6C5-08C4C156CB9E}"/>
             </c:ext>
@@ -452,7 +455,7 @@
 </file>
 
 <file path=ppt/charts/chart2.xml><?xml version="1.0" encoding="utf-8"?>
-<c:chartSpace xmlns:c="http://schemas.openxmlformats.org/drawingml/2006/chart" xmlns:a="http://schemas.openxmlformats.org/drawingml/2006/main" xmlns:r="http://schemas.openxmlformats.org/officeDocument/2006/relationships">
+<c:chartSpace xmlns:c="http://schemas.openxmlformats.org/drawingml/2006/chart" xmlns:a="http://schemas.openxmlformats.org/drawingml/2006/main" xmlns:r="http://schemas.openxmlformats.org/officeDocument/2006/relationships" xmlns:c16r2="http://schemas.microsoft.com/office/drawing/2015/06/chart">
   <c:date1904 val="0"/>
   <c:lang val="de-DE"/>
   <c:roundedCorners val="0"/>
@@ -549,7 +552,7 @@
             </c:numRef>
           </c:yVal>
           <c:smooth val="0"/>
-          <c:extLst xmlns:c16r2="http://schemas.microsoft.com/office/drawing/2015/06/chart">
+          <c:extLst>
             <c:ext xmlns:c16="http://schemas.microsoft.com/office/drawing/2014/chart" uri="{C3380CC4-5D6E-409C-BE32-E72D297353CC}">
               <c16:uniqueId val="{00000000-3913-4CCA-937B-BFE2918FD451}"/>
             </c:ext>
@@ -633,7 +636,7 @@
             </c:numRef>
           </c:yVal>
           <c:smooth val="0"/>
-          <c:extLst xmlns:c16r2="http://schemas.microsoft.com/office/drawing/2015/06/chart">
+          <c:extLst>
             <c:ext xmlns:c16="http://schemas.microsoft.com/office/drawing/2014/chart" uri="{C3380CC4-5D6E-409C-BE32-E72D297353CC}">
               <c16:uniqueId val="{00000001-3913-4CCA-937B-BFE2918FD451}"/>
             </c:ext>
@@ -717,7 +720,7 @@
             </c:numRef>
           </c:yVal>
           <c:smooth val="0"/>
-          <c:extLst xmlns:c16r2="http://schemas.microsoft.com/office/drawing/2015/06/chart">
+          <c:extLst>
             <c:ext xmlns:c16="http://schemas.microsoft.com/office/drawing/2014/chart" uri="{C3380CC4-5D6E-409C-BE32-E72D297353CC}">
               <c16:uniqueId val="{00000002-3913-4CCA-937B-BFE2918FD451}"/>
             </c:ext>
@@ -1592,7 +1595,7 @@
               <a:rPr lang="de-DE" smtClean="0"/>
               <a:t>16</a:t>
             </a:fld>
-            <a:endParaRPr lang="de-DE"/>
+            <a:endParaRPr lang="de-DE" dirty="0"/>
           </a:p>
         </p:txBody>
       </p:sp>
@@ -1680,7 +1683,7 @@
               <a:rPr lang="de-DE" smtClean="0"/>
               <a:t>17</a:t>
             </a:fld>
-            <a:endParaRPr lang="de-DE"/>
+            <a:endParaRPr lang="de-DE" dirty="0"/>
           </a:p>
         </p:txBody>
       </p:sp>
@@ -2303,6 +2306,270 @@
     <p:extLst>
       <p:ext uri="{BB962C8B-B14F-4D97-AF65-F5344CB8AC3E}">
         <p14:creationId xmlns:p14="http://schemas.microsoft.com/office/powerpoint/2010/main" val="3050164613"/>
+      </p:ext>
+    </p:extLst>
+  </p:cSld>
+  <p:clrMapOvr>
+    <a:masterClrMapping/>
+  </p:clrMapOvr>
+</p:notes>
+</file>
+
+<file path=ppt/notesSlides/notesSlide21.xml><?xml version="1.0" encoding="utf-8"?>
+<p:notes xmlns:a="http://schemas.openxmlformats.org/drawingml/2006/main" xmlns:r="http://schemas.openxmlformats.org/officeDocument/2006/relationships" xmlns:p="http://schemas.openxmlformats.org/presentationml/2006/main">
+  <p:cSld>
+    <p:spTree>
+      <p:nvGrpSpPr>
+        <p:cNvPr id="1" name=""/>
+        <p:cNvGrpSpPr/>
+        <p:nvPr/>
+      </p:nvGrpSpPr>
+      <p:grpSpPr>
+        <a:xfrm>
+          <a:off x="0" y="0"/>
+          <a:ext cx="0" cy="0"/>
+          <a:chOff x="0" y="0"/>
+          <a:chExt cx="0" cy="0"/>
+        </a:xfrm>
+      </p:grpSpPr>
+      <p:sp>
+        <p:nvSpPr>
+          <p:cNvPr id="2" name="Folienbildplatzhalter 1"/>
+          <p:cNvSpPr>
+            <a:spLocks noGrp="1" noRot="1" noChangeAspect="1"/>
+          </p:cNvSpPr>
+          <p:nvPr>
+            <p:ph type="sldImg"/>
+          </p:nvPr>
+        </p:nvSpPr>
+        <p:spPr/>
+      </p:sp>
+      <p:sp>
+        <p:nvSpPr>
+          <p:cNvPr id="3" name="Notizenplatzhalter 2"/>
+          <p:cNvSpPr>
+            <a:spLocks noGrp="1"/>
+          </p:cNvSpPr>
+          <p:nvPr>
+            <p:ph type="body" idx="1"/>
+          </p:nvPr>
+        </p:nvSpPr>
+        <p:spPr/>
+        <p:txBody>
+          <a:bodyPr/>
+          <a:lstStyle/>
+          <a:p>
+            <a:r>
+              <a:rPr lang="de-DE" dirty="0" smtClean="0"/>
+              <a:t>MANU</a:t>
+            </a:r>
+            <a:endParaRPr lang="de-DE" dirty="0"/>
+          </a:p>
+        </p:txBody>
+      </p:sp>
+      <p:sp>
+        <p:nvSpPr>
+          <p:cNvPr id="4" name="Foliennummernplatzhalter 3"/>
+          <p:cNvSpPr>
+            <a:spLocks noGrp="1"/>
+          </p:cNvSpPr>
+          <p:nvPr>
+            <p:ph type="sldNum" sz="quarter" idx="10"/>
+          </p:nvPr>
+        </p:nvSpPr>
+        <p:spPr/>
+        <p:txBody>
+          <a:bodyPr/>
+          <a:lstStyle/>
+          <a:p>
+            <a:fld id="{4C40B096-980F-4B1D-B616-BA01D9772A24}" type="slidenum">
+              <a:rPr lang="de-DE" smtClean="0"/>
+              <a:t>26</a:t>
+            </a:fld>
+            <a:endParaRPr lang="de-DE"/>
+          </a:p>
+        </p:txBody>
+      </p:sp>
+    </p:spTree>
+    <p:extLst>
+      <p:ext uri="{BB962C8B-B14F-4D97-AF65-F5344CB8AC3E}">
+        <p14:creationId xmlns:p14="http://schemas.microsoft.com/office/powerpoint/2010/main" val="1710683816"/>
+      </p:ext>
+    </p:extLst>
+  </p:cSld>
+  <p:clrMapOvr>
+    <a:masterClrMapping/>
+  </p:clrMapOvr>
+</p:notes>
+</file>
+
+<file path=ppt/notesSlides/notesSlide22.xml><?xml version="1.0" encoding="utf-8"?>
+<p:notes xmlns:a="http://schemas.openxmlformats.org/drawingml/2006/main" xmlns:r="http://schemas.openxmlformats.org/officeDocument/2006/relationships" xmlns:p="http://schemas.openxmlformats.org/presentationml/2006/main">
+  <p:cSld>
+    <p:spTree>
+      <p:nvGrpSpPr>
+        <p:cNvPr id="1" name=""/>
+        <p:cNvGrpSpPr/>
+        <p:nvPr/>
+      </p:nvGrpSpPr>
+      <p:grpSpPr>
+        <a:xfrm>
+          <a:off x="0" y="0"/>
+          <a:ext cx="0" cy="0"/>
+          <a:chOff x="0" y="0"/>
+          <a:chExt cx="0" cy="0"/>
+        </a:xfrm>
+      </p:grpSpPr>
+      <p:sp>
+        <p:nvSpPr>
+          <p:cNvPr id="2" name="Folienbildplatzhalter 1"/>
+          <p:cNvSpPr>
+            <a:spLocks noGrp="1" noRot="1" noChangeAspect="1"/>
+          </p:cNvSpPr>
+          <p:nvPr>
+            <p:ph type="sldImg"/>
+          </p:nvPr>
+        </p:nvSpPr>
+        <p:spPr/>
+      </p:sp>
+      <p:sp>
+        <p:nvSpPr>
+          <p:cNvPr id="3" name="Notizenplatzhalter 2"/>
+          <p:cNvSpPr>
+            <a:spLocks noGrp="1"/>
+          </p:cNvSpPr>
+          <p:nvPr>
+            <p:ph type="body" idx="1"/>
+          </p:nvPr>
+        </p:nvSpPr>
+        <p:spPr/>
+        <p:txBody>
+          <a:bodyPr/>
+          <a:lstStyle/>
+          <a:p>
+            <a:r>
+              <a:rPr lang="de-DE" dirty="0" smtClean="0"/>
+              <a:t>MANU</a:t>
+            </a:r>
+            <a:endParaRPr lang="de-DE" dirty="0"/>
+          </a:p>
+        </p:txBody>
+      </p:sp>
+      <p:sp>
+        <p:nvSpPr>
+          <p:cNvPr id="4" name="Foliennummernplatzhalter 3"/>
+          <p:cNvSpPr>
+            <a:spLocks noGrp="1"/>
+          </p:cNvSpPr>
+          <p:nvPr>
+            <p:ph type="sldNum" sz="quarter" idx="10"/>
+          </p:nvPr>
+        </p:nvSpPr>
+        <p:spPr/>
+        <p:txBody>
+          <a:bodyPr/>
+          <a:lstStyle/>
+          <a:p>
+            <a:fld id="{4C40B096-980F-4B1D-B616-BA01D9772A24}" type="slidenum">
+              <a:rPr lang="de-DE" smtClean="0"/>
+              <a:t>29</a:t>
+            </a:fld>
+            <a:endParaRPr lang="de-DE"/>
+          </a:p>
+        </p:txBody>
+      </p:sp>
+    </p:spTree>
+    <p:extLst>
+      <p:ext uri="{BB962C8B-B14F-4D97-AF65-F5344CB8AC3E}">
+        <p14:creationId xmlns:p14="http://schemas.microsoft.com/office/powerpoint/2010/main" val="3978802102"/>
+      </p:ext>
+    </p:extLst>
+  </p:cSld>
+  <p:clrMapOvr>
+    <a:masterClrMapping/>
+  </p:clrMapOvr>
+</p:notes>
+</file>
+
+<file path=ppt/notesSlides/notesSlide23.xml><?xml version="1.0" encoding="utf-8"?>
+<p:notes xmlns:a="http://schemas.openxmlformats.org/drawingml/2006/main" xmlns:r="http://schemas.openxmlformats.org/officeDocument/2006/relationships" xmlns:p="http://schemas.openxmlformats.org/presentationml/2006/main">
+  <p:cSld>
+    <p:spTree>
+      <p:nvGrpSpPr>
+        <p:cNvPr id="1" name=""/>
+        <p:cNvGrpSpPr/>
+        <p:nvPr/>
+      </p:nvGrpSpPr>
+      <p:grpSpPr>
+        <a:xfrm>
+          <a:off x="0" y="0"/>
+          <a:ext cx="0" cy="0"/>
+          <a:chOff x="0" y="0"/>
+          <a:chExt cx="0" cy="0"/>
+        </a:xfrm>
+      </p:grpSpPr>
+      <p:sp>
+        <p:nvSpPr>
+          <p:cNvPr id="2" name="Folienbildplatzhalter 1"/>
+          <p:cNvSpPr>
+            <a:spLocks noGrp="1" noRot="1" noChangeAspect="1"/>
+          </p:cNvSpPr>
+          <p:nvPr>
+            <p:ph type="sldImg"/>
+          </p:nvPr>
+        </p:nvSpPr>
+        <p:spPr/>
+      </p:sp>
+      <p:sp>
+        <p:nvSpPr>
+          <p:cNvPr id="3" name="Notizenplatzhalter 2"/>
+          <p:cNvSpPr>
+            <a:spLocks noGrp="1"/>
+          </p:cNvSpPr>
+          <p:nvPr>
+            <p:ph type="body" idx="1"/>
+          </p:nvPr>
+        </p:nvSpPr>
+        <p:spPr/>
+        <p:txBody>
+          <a:bodyPr/>
+          <a:lstStyle/>
+          <a:p>
+            <a:r>
+              <a:rPr lang="de-DE" dirty="0" smtClean="0"/>
+              <a:t>MANU</a:t>
+            </a:r>
+            <a:endParaRPr lang="de-DE" dirty="0"/>
+          </a:p>
+        </p:txBody>
+      </p:sp>
+      <p:sp>
+        <p:nvSpPr>
+          <p:cNvPr id="4" name="Foliennummernplatzhalter 3"/>
+          <p:cNvSpPr>
+            <a:spLocks noGrp="1"/>
+          </p:cNvSpPr>
+          <p:nvPr>
+            <p:ph type="sldNum" sz="quarter" idx="10"/>
+          </p:nvPr>
+        </p:nvSpPr>
+        <p:spPr/>
+        <p:txBody>
+          <a:bodyPr/>
+          <a:lstStyle/>
+          <a:p>
+            <a:fld id="{4C40B096-980F-4B1D-B616-BA01D9772A24}" type="slidenum">
+              <a:rPr lang="de-DE" smtClean="0"/>
+              <a:t>30</a:t>
+            </a:fld>
+            <a:endParaRPr lang="de-DE"/>
+          </a:p>
+        </p:txBody>
+      </p:sp>
+    </p:spTree>
+    <p:extLst>
+      <p:ext uri="{BB962C8B-B14F-4D97-AF65-F5344CB8AC3E}">
+        <p14:creationId xmlns:p14="http://schemas.microsoft.com/office/powerpoint/2010/main" val="3432888230"/>
       </p:ext>
     </p:extLst>
   </p:cSld>
@@ -8241,6 +8508,16 @@
           <a:lstStyle/>
           <a:p>
             <a:r>
+              <a:rPr lang="de-DE" dirty="0">
+                <a:solidFill>
+                  <a:schemeClr val="bg1">
+                    <a:lumMod val="50000"/>
+                  </a:schemeClr>
+                </a:solidFill>
+              </a:rPr>
+              <a:t>ENVIRONMENT, </a:t>
+            </a:r>
+            <a:r>
               <a:rPr lang="de-DE" dirty="0" smtClean="0">
                 <a:solidFill>
                   <a:schemeClr val="bg1">
@@ -8248,7 +8525,7 @@
                   </a:schemeClr>
                 </a:solidFill>
               </a:rPr>
-              <a:t>DEPLOYMENT</a:t>
+              <a:t>INTEGRATION AND AUTOMATION</a:t>
             </a:r>
             <a:endParaRPr lang="de-DE" dirty="0">
               <a:solidFill>
@@ -8365,6 +8642,47 @@
           </a:extLst>
         </p:spPr>
       </p:pic>
+      <p:pic>
+        <p:nvPicPr>
+          <p:cNvPr id="3" name="Picture 2" descr="https://cloud.google.com/tools/images/icon_IntelliJIDEA.png"/>
+          <p:cNvPicPr>
+            <a:picLocks noChangeAspect="1" noChangeArrowheads="1"/>
+          </p:cNvPicPr>
+          <p:nvPr/>
+        </p:nvPicPr>
+        <p:blipFill>
+          <a:blip r:embed="rId5" cstate="print">
+            <a:extLst>
+              <a:ext uri="{28A0092B-C50C-407E-A947-70E740481C1C}">
+                <a14:useLocalDpi xmlns:a14="http://schemas.microsoft.com/office/drawing/2010/main" val="0"/>
+              </a:ext>
+            </a:extLst>
+          </a:blip>
+          <a:srcRect/>
+          <a:stretch>
+            <a:fillRect/>
+          </a:stretch>
+        </p:blipFill>
+        <p:spPr bwMode="auto">
+          <a:xfrm>
+            <a:off x="3163115" y="5467350"/>
+            <a:ext cx="363538" cy="363538"/>
+          </a:xfrm>
+          <a:prstGeom prst="rect">
+            <a:avLst/>
+          </a:prstGeom>
+          <a:noFill/>
+          <a:extLst>
+            <a:ext uri="{909E8E84-426E-40DD-AFC4-6F175D3DCCD1}">
+              <a14:hiddenFill xmlns:a14="http://schemas.microsoft.com/office/drawing/2010/main">
+                <a:solidFill>
+                  <a:srgbClr val="FFFFFF"/>
+                </a:solidFill>
+              </a14:hiddenFill>
+            </a:ext>
+          </a:extLst>
+        </p:spPr>
+      </p:pic>
     </p:spTree>
     <p:extLst>
       <p:ext uri="{BB962C8B-B14F-4D97-AF65-F5344CB8AC3E}">
@@ -8450,7 +8768,7 @@
               <a:rPr lang="de-DE" smtClean="0"/>
               <a:t>17</a:t>
             </a:fld>
-            <a:endParaRPr lang="de-DE"/>
+            <a:endParaRPr lang="de-DE" dirty="0"/>
           </a:p>
         </p:txBody>
       </p:sp>
@@ -9912,8 +10230,8 @@
               <a:t>Project </a:t>
             </a:r>
             <a:r>
-              <a:rPr lang="de-DE" dirty="0" err="1" smtClean="0"/>
-              <a:t>Methodology</a:t>
+              <a:rPr lang="de-DE" dirty="0" smtClean="0"/>
+              <a:t>Management</a:t>
             </a:r>
             <a:endParaRPr lang="de-DE" dirty="0" smtClean="0"/>
           </a:p>
@@ -10001,16 +10319,21 @@
             </a:pPr>
             <a:r>
               <a:rPr lang="de-DE" dirty="0" smtClean="0"/>
-              <a:t>Automation </a:t>
+              <a:t>Environment, </a:t>
+            </a:r>
+            <a:r>
+              <a:rPr lang="de-DE" dirty="0" smtClean="0"/>
+              <a:t>Integration </a:t>
             </a:r>
             <a:r>
               <a:rPr lang="de-DE" dirty="0" err="1" smtClean="0"/>
               <a:t>and</a:t>
             </a:r>
             <a:r>
-              <a:rPr lang="de-DE" dirty="0" smtClean="0"/>
-              <a:t> Integration</a:t>
-            </a:r>
+              <a:rPr lang="de-DE" dirty="0" err="1" smtClean="0"/>
+              <a:t>Automation</a:t>
+            </a:r>
+            <a:endParaRPr lang="de-DE" dirty="0" smtClean="0"/>
           </a:p>
           <a:p>
             <a:pPr marL="749808" lvl="1" indent="-457200">
@@ -10329,7 +10652,7 @@
                   </a:schemeClr>
                 </a:solidFill>
               </a:rPr>
-              <a:t>ARCHITEKTUR</a:t>
+              <a:t>ARCHITECTURE</a:t>
             </a:r>
             <a:endParaRPr lang="de-DE" dirty="0">
               <a:solidFill>
@@ -11316,6 +11639,127 @@
           <a:chExt cx="0" cy="0"/>
         </a:xfrm>
       </p:grpSpPr>
+      <p:sp>
+        <p:nvSpPr>
+          <p:cNvPr id="2" name="Titel 1"/>
+          <p:cNvSpPr>
+            <a:spLocks noGrp="1"/>
+          </p:cNvSpPr>
+          <p:nvPr>
+            <p:ph type="title"/>
+          </p:nvPr>
+        </p:nvSpPr>
+        <p:spPr/>
+        <p:txBody>
+          <a:bodyPr/>
+          <a:lstStyle/>
+          <a:p>
+            <a:r>
+              <a:rPr lang="de-DE" dirty="0" smtClean="0">
+                <a:solidFill>
+                  <a:schemeClr val="bg1">
+                    <a:lumMod val="50000"/>
+                  </a:schemeClr>
+                </a:solidFill>
+              </a:rPr>
+              <a:t>AUSBLICK?</a:t>
+            </a:r>
+            <a:endParaRPr lang="de-DE" dirty="0">
+              <a:solidFill>
+                <a:schemeClr val="bg1">
+                  <a:lumMod val="50000"/>
+                </a:schemeClr>
+              </a:solidFill>
+            </a:endParaRPr>
+          </a:p>
+        </p:txBody>
+      </p:sp>
+      <p:sp>
+        <p:nvSpPr>
+          <p:cNvPr id="3" name="Inhaltsplatzhalter 2"/>
+          <p:cNvSpPr>
+            <a:spLocks noGrp="1"/>
+          </p:cNvSpPr>
+          <p:nvPr>
+            <p:ph idx="1"/>
+          </p:nvPr>
+        </p:nvSpPr>
+        <p:spPr>
+          <a:xfrm>
+            <a:off x="1097280" y="1845733"/>
+            <a:ext cx="10058400" cy="4685695"/>
+          </a:xfrm>
+        </p:spPr>
+        <p:txBody>
+          <a:bodyPr>
+            <a:normAutofit/>
+          </a:bodyPr>
+          <a:lstStyle/>
+          <a:p>
+            <a:endParaRPr lang="de-DE" dirty="0"/>
+          </a:p>
+        </p:txBody>
+      </p:sp>
+      <p:sp>
+        <p:nvSpPr>
+          <p:cNvPr id="5" name="Foliennummernplatzhalter 4"/>
+          <p:cNvSpPr>
+            <a:spLocks noGrp="1"/>
+          </p:cNvSpPr>
+          <p:nvPr>
+            <p:ph type="sldNum" sz="quarter" idx="12"/>
+          </p:nvPr>
+        </p:nvSpPr>
+        <p:spPr/>
+        <p:txBody>
+          <a:bodyPr/>
+          <a:lstStyle/>
+          <a:p>
+            <a:fld id="{BEA2534F-1EDD-48ED-BC5A-02D188FC5C63}" type="slidenum">
+              <a:rPr lang="de-DE" smtClean="0"/>
+              <a:t>26</a:t>
+            </a:fld>
+            <a:endParaRPr lang="de-DE" dirty="0"/>
+          </a:p>
+        </p:txBody>
+      </p:sp>
+    </p:spTree>
+    <p:extLst>
+      <p:ext uri="{BB962C8B-B14F-4D97-AF65-F5344CB8AC3E}">
+        <p14:creationId xmlns:p14="http://schemas.microsoft.com/office/powerpoint/2010/main" val="3074163556"/>
+      </p:ext>
+    </p:extLst>
+  </p:cSld>
+  <p:clrMapOvr>
+    <a:masterClrMapping/>
+  </p:clrMapOvr>
+  <p:timing>
+    <p:tnLst>
+      <p:par>
+        <p:cTn id="1" dur="indefinite" restart="never" nodeType="tmRoot"/>
+      </p:par>
+    </p:tnLst>
+  </p:timing>
+</p:sld>
+</file>
+
+<file path=ppt/slides/slide27.xml><?xml version="1.0" encoding="utf-8"?>
+<p:sld xmlns:a="http://schemas.openxmlformats.org/drawingml/2006/main" xmlns:r="http://schemas.openxmlformats.org/officeDocument/2006/relationships" xmlns:p="http://schemas.openxmlformats.org/presentationml/2006/main">
+  <p:cSld>
+    <p:spTree>
+      <p:nvGrpSpPr>
+        <p:cNvPr id="1" name=""/>
+        <p:cNvGrpSpPr/>
+        <p:nvPr/>
+      </p:nvGrpSpPr>
+      <p:grpSpPr>
+        <a:xfrm>
+          <a:off x="0" y="0"/>
+          <a:ext cx="0" cy="0"/>
+          <a:chOff x="0" y="0"/>
+          <a:chExt cx="0" cy="0"/>
+        </a:xfrm>
+      </p:grpSpPr>
       <p:pic>
         <p:nvPicPr>
           <p:cNvPr id="3074" name="Picture 2" descr="C:\Duales Studium\01 Theorie\4. Semester\03 Software Engineering\docs\logos\nappy2.png"/>
@@ -11374,7 +11818,7 @@
           <a:p>
             <a:fld id="{BEA2534F-1EDD-48ED-BC5A-02D188FC5C63}" type="slidenum">
               <a:rPr lang="de-DE" smtClean="0"/>
-              <a:t>26</a:t>
+              <a:t>27</a:t>
             </a:fld>
             <a:endParaRPr lang="de-DE"/>
           </a:p>
@@ -11428,7 +11872,7 @@
 </p:sld>
 </file>
 
-<file path=ppt/slides/slide27.xml><?xml version="1.0" encoding="utf-8"?>
+<file path=ppt/slides/slide28.xml><?xml version="1.0" encoding="utf-8"?>
 <p:sld xmlns:a="http://schemas.openxmlformats.org/drawingml/2006/main" xmlns:r="http://schemas.openxmlformats.org/officeDocument/2006/relationships" xmlns:p="http://schemas.openxmlformats.org/presentationml/2006/main">
   <p:cSld>
     <p:spTree>
@@ -11462,7 +11906,7 @@
           <a:p>
             <a:fld id="{BEA2534F-1EDD-48ED-BC5A-02D188FC5C63}" type="slidenum">
               <a:rPr lang="de-DE" smtClean="0"/>
-              <a:t>27</a:t>
+              <a:t>28</a:t>
             </a:fld>
             <a:endParaRPr lang="de-DE"/>
           </a:p>
@@ -11837,6 +12281,467 @@
 </p:sld>
 </file>
 
+<file path=ppt/slides/slide29.xml><?xml version="1.0" encoding="utf-8"?>
+<p:sld xmlns:a="http://schemas.openxmlformats.org/drawingml/2006/main" xmlns:r="http://schemas.openxmlformats.org/officeDocument/2006/relationships" xmlns:p="http://schemas.openxmlformats.org/presentationml/2006/main">
+  <p:cSld>
+    <p:spTree>
+      <p:nvGrpSpPr>
+        <p:cNvPr id="1" name=""/>
+        <p:cNvGrpSpPr/>
+        <p:nvPr/>
+      </p:nvGrpSpPr>
+      <p:grpSpPr>
+        <a:xfrm>
+          <a:off x="0" y="0"/>
+          <a:ext cx="0" cy="0"/>
+          <a:chOff x="0" y="0"/>
+          <a:chExt cx="0" cy="0"/>
+        </a:xfrm>
+      </p:grpSpPr>
+      <p:sp>
+        <p:nvSpPr>
+          <p:cNvPr id="2" name="Titel 1"/>
+          <p:cNvSpPr>
+            <a:spLocks noGrp="1"/>
+          </p:cNvSpPr>
+          <p:nvPr>
+            <p:ph type="title"/>
+          </p:nvPr>
+        </p:nvSpPr>
+        <p:spPr/>
+        <p:txBody>
+          <a:bodyPr/>
+          <a:lstStyle/>
+          <a:p>
+            <a:r>
+              <a:rPr lang="de-DE" dirty="0" smtClean="0">
+                <a:solidFill>
+                  <a:schemeClr val="bg1">
+                    <a:lumMod val="50000"/>
+                  </a:schemeClr>
+                </a:solidFill>
+              </a:rPr>
+              <a:t>LINKS</a:t>
+            </a:r>
+            <a:endParaRPr lang="de-DE" dirty="0">
+              <a:solidFill>
+                <a:schemeClr val="bg1">
+                  <a:lumMod val="50000"/>
+                </a:schemeClr>
+              </a:solidFill>
+            </a:endParaRPr>
+          </a:p>
+        </p:txBody>
+      </p:sp>
+      <p:sp>
+        <p:nvSpPr>
+          <p:cNvPr id="3" name="Inhaltsplatzhalter 2"/>
+          <p:cNvSpPr>
+            <a:spLocks noGrp="1"/>
+          </p:cNvSpPr>
+          <p:nvPr>
+            <p:ph idx="1"/>
+          </p:nvPr>
+        </p:nvSpPr>
+        <p:spPr>
+          <a:xfrm>
+            <a:off x="1097280" y="1731433"/>
+            <a:ext cx="10058400" cy="4355041"/>
+          </a:xfrm>
+        </p:spPr>
+        <p:txBody>
+          <a:bodyPr>
+            <a:noAutofit/>
+          </a:bodyPr>
+          <a:lstStyle/>
+          <a:p>
+            <a:r>
+              <a:rPr lang="de-DE" sz="1100" dirty="0"/>
+              <a:t>JIRA - </a:t>
+            </a:r>
+            <a:r>
+              <a:rPr lang="de-DE" sz="1100" dirty="0">
+                <a:hlinkClick r:id="rId3"/>
+              </a:rPr>
+              <a:t>http://</a:t>
+            </a:r>
+            <a:r>
+              <a:rPr lang="de-DE" sz="1100" dirty="0" smtClean="0">
+                <a:hlinkClick r:id="rId3"/>
+              </a:rPr>
+              <a:t>193.196.7.27:8080/secure/RapidBoard.jspa?rapidView=8&amp;projectKey=NAP&amp;view=planning</a:t>
+            </a:r>
+            <a:endParaRPr lang="de-DE" sz="1100" dirty="0" smtClean="0"/>
+          </a:p>
+          <a:p>
+            <a:r>
+              <a:rPr lang="de-DE" sz="1100" dirty="0" smtClean="0"/>
+              <a:t>Code </a:t>
+            </a:r>
+            <a:r>
+              <a:rPr lang="de-DE" sz="1100" dirty="0"/>
+              <a:t>- </a:t>
+            </a:r>
+            <a:r>
+              <a:rPr lang="de-DE" sz="1100" dirty="0">
+                <a:hlinkClick r:id="rId4"/>
+              </a:rPr>
+              <a:t>https://</a:t>
+            </a:r>
+            <a:r>
+              <a:rPr lang="de-DE" sz="1100" dirty="0" smtClean="0">
+                <a:hlinkClick r:id="rId4"/>
+              </a:rPr>
+              <a:t>github.com/nappydevelopment/Nappy-the-ingenious</a:t>
+            </a:r>
+            <a:r>
+              <a:rPr lang="de-DE" sz="1100" dirty="0" smtClean="0"/>
+              <a:t> </a:t>
+            </a:r>
+          </a:p>
+          <a:p>
+            <a:r>
+              <a:rPr lang="de-DE" sz="1100" dirty="0"/>
+              <a:t>Download - </a:t>
+            </a:r>
+            <a:r>
+              <a:rPr lang="de-DE" sz="1100" dirty="0">
+                <a:hlinkClick r:id="rId5"/>
+              </a:rPr>
+              <a:t>https://</a:t>
+            </a:r>
+            <a:r>
+              <a:rPr lang="de-DE" sz="1100" dirty="0" smtClean="0">
+                <a:hlinkClick r:id="rId5"/>
+              </a:rPr>
+              <a:t>github.com/nappydevelopment/Nappy-the-ingenious/blob/master/README.md</a:t>
+            </a:r>
+            <a:r>
+              <a:rPr lang="de-DE" sz="1100" dirty="0" smtClean="0"/>
+              <a:t> </a:t>
+            </a:r>
+          </a:p>
+          <a:p>
+            <a:r>
+              <a:rPr lang="de-DE" sz="1100" dirty="0"/>
+              <a:t>Coveralls - </a:t>
+            </a:r>
+            <a:r>
+              <a:rPr lang="de-DE" sz="1100" dirty="0">
+                <a:hlinkClick r:id="rId6"/>
+              </a:rPr>
+              <a:t>https://</a:t>
+            </a:r>
+            <a:r>
+              <a:rPr lang="de-DE" sz="1100" dirty="0" smtClean="0">
+                <a:hlinkClick r:id="rId6"/>
+              </a:rPr>
+              <a:t>coveralls.io/github/nappydevelopment/Nappy-the-ingenious?branch=master</a:t>
+            </a:r>
+            <a:r>
+              <a:rPr lang="de-DE" sz="1100" dirty="0" smtClean="0"/>
+              <a:t> </a:t>
+            </a:r>
+          </a:p>
+          <a:p>
+            <a:r>
+              <a:rPr lang="de-DE" sz="1100" dirty="0" err="1" smtClean="0"/>
+              <a:t>Codacy</a:t>
+            </a:r>
+            <a:r>
+              <a:rPr lang="de-DE" sz="1100" dirty="0"/>
+              <a:t> - </a:t>
+            </a:r>
+            <a:r>
+              <a:rPr lang="de-DE" sz="1100" dirty="0">
+                <a:hlinkClick r:id="rId7"/>
+              </a:rPr>
+              <a:t>https://</a:t>
+            </a:r>
+            <a:r>
+              <a:rPr lang="de-DE" sz="1100" dirty="0" smtClean="0">
+                <a:hlinkClick r:id="rId7"/>
+              </a:rPr>
+              <a:t>www.codacy.com/app/NappyDevelopment/Nappy-the-ingenious/dashboard</a:t>
+            </a:r>
+            <a:r>
+              <a:rPr lang="de-DE" sz="1100" dirty="0" smtClean="0"/>
+              <a:t> </a:t>
+            </a:r>
+          </a:p>
+          <a:p>
+            <a:r>
+              <a:rPr lang="de-DE" sz="1100" dirty="0" err="1" smtClean="0"/>
+              <a:t>SonarQube</a:t>
+            </a:r>
+            <a:r>
+              <a:rPr lang="de-DE" sz="1100" dirty="0"/>
+              <a:t> - </a:t>
+            </a:r>
+            <a:r>
+              <a:rPr lang="de-DE" sz="1100" dirty="0">
+                <a:hlinkClick r:id="rId8"/>
+              </a:rPr>
+              <a:t>http://</a:t>
+            </a:r>
+            <a:r>
+              <a:rPr lang="de-DE" sz="1100" dirty="0" smtClean="0">
+                <a:hlinkClick r:id="rId8"/>
+              </a:rPr>
+              <a:t>193.196.7.25/overview?id=5235</a:t>
+            </a:r>
+            <a:r>
+              <a:rPr lang="de-DE" sz="1100" dirty="0" smtClean="0"/>
+              <a:t> </a:t>
+            </a:r>
+          </a:p>
+          <a:p>
+            <a:r>
+              <a:rPr lang="de-DE" sz="1100" dirty="0"/>
+              <a:t>Blog - </a:t>
+            </a:r>
+            <a:r>
+              <a:rPr lang="de-DE" sz="1100" dirty="0">
+                <a:hlinkClick r:id="rId9"/>
+              </a:rPr>
+              <a:t>https://nappydevelopment.wordpress.com</a:t>
+            </a:r>
+            <a:r>
+              <a:rPr lang="de-DE" sz="1100" dirty="0" smtClean="0">
+                <a:hlinkClick r:id="rId9"/>
+              </a:rPr>
+              <a:t>/</a:t>
+            </a:r>
+            <a:r>
+              <a:rPr lang="de-DE" sz="1100" dirty="0" smtClean="0"/>
+              <a:t> </a:t>
+            </a:r>
+          </a:p>
+          <a:p>
+            <a:r>
+              <a:rPr lang="de-DE" sz="1100" dirty="0" smtClean="0"/>
+              <a:t>Blog </a:t>
+            </a:r>
+            <a:r>
+              <a:rPr lang="de-DE" sz="1100" dirty="0" err="1" smtClean="0"/>
+              <a:t>as</a:t>
+            </a:r>
+            <a:r>
+              <a:rPr lang="de-DE" sz="1100" dirty="0"/>
+              <a:t> PDF - </a:t>
+            </a:r>
+            <a:r>
+              <a:rPr lang="de-DE" sz="1100" dirty="0">
+                <a:hlinkClick r:id="rId10"/>
+              </a:rPr>
+              <a:t>https://</a:t>
+            </a:r>
+            <a:r>
+              <a:rPr lang="de-DE" sz="1100" dirty="0" smtClean="0">
+                <a:hlinkClick r:id="rId10"/>
+              </a:rPr>
+              <a:t>github.com/nappydevelopment/docs/blob/master/pdfs/Blog%20As%20Book.pdf</a:t>
+            </a:r>
+            <a:r>
+              <a:rPr lang="de-DE" sz="1100" dirty="0" smtClean="0"/>
+              <a:t> </a:t>
+            </a:r>
+          </a:p>
+          <a:p>
+            <a:r>
+              <a:rPr lang="de-DE" sz="1100" dirty="0" err="1" smtClean="0"/>
+              <a:t>Docs</a:t>
+            </a:r>
+            <a:r>
+              <a:rPr lang="de-DE" sz="1100" dirty="0" smtClean="0"/>
+              <a:t> </a:t>
+            </a:r>
+            <a:r>
+              <a:rPr lang="de-DE" sz="1100" dirty="0"/>
+              <a:t>- </a:t>
+            </a:r>
+            <a:r>
+              <a:rPr lang="de-DE" sz="1100" dirty="0">
+                <a:hlinkClick r:id="rId11"/>
+              </a:rPr>
+              <a:t>https://github.com/nappydevelopment/docs/</a:t>
+            </a:r>
+            <a:r>
+              <a:rPr lang="de-DE" sz="1100" dirty="0"/>
+              <a:t> </a:t>
+            </a:r>
+            <a:endParaRPr lang="de-DE" sz="1100" dirty="0" smtClean="0"/>
+          </a:p>
+          <a:p>
+            <a:r>
+              <a:rPr lang="de-DE" sz="1100" dirty="0"/>
+              <a:t>SRS - </a:t>
+            </a:r>
+            <a:r>
+              <a:rPr lang="de-DE" sz="1100" dirty="0">
+                <a:hlinkClick r:id="rId12"/>
+              </a:rPr>
+              <a:t>https://</a:t>
+            </a:r>
+            <a:r>
+              <a:rPr lang="de-DE" sz="1100" dirty="0" smtClean="0">
+                <a:hlinkClick r:id="rId12"/>
+              </a:rPr>
+              <a:t>github.com/nappydevelopment/docs/blob/master/pdfs/Software%20Requirements%20Specification.pdf</a:t>
+            </a:r>
+            <a:r>
+              <a:rPr lang="de-DE" sz="1100" dirty="0" smtClean="0"/>
+              <a:t> </a:t>
+            </a:r>
+          </a:p>
+          <a:p>
+            <a:r>
+              <a:rPr lang="de-DE" sz="1100" dirty="0"/>
+              <a:t>SAD - </a:t>
+            </a:r>
+            <a:r>
+              <a:rPr lang="de-DE" sz="1100" dirty="0">
+                <a:hlinkClick r:id="rId13"/>
+              </a:rPr>
+              <a:t>https://</a:t>
+            </a:r>
+            <a:r>
+              <a:rPr lang="de-DE" sz="1100" dirty="0" smtClean="0">
+                <a:hlinkClick r:id="rId13"/>
+              </a:rPr>
+              <a:t>github.com/nappydevelopment/docs/blob/master/pdfs/Software%20Architecture%20Document.pdf</a:t>
+            </a:r>
+            <a:r>
+              <a:rPr lang="de-DE" sz="1100" dirty="0" smtClean="0"/>
+              <a:t> </a:t>
+            </a:r>
+          </a:p>
+          <a:p>
+            <a:r>
+              <a:rPr lang="de-DE" sz="1100" dirty="0"/>
+              <a:t>Testplan - </a:t>
+            </a:r>
+            <a:r>
+              <a:rPr lang="de-DE" sz="1100" dirty="0">
+                <a:hlinkClick r:id="rId14"/>
+              </a:rPr>
+              <a:t>https://</a:t>
+            </a:r>
+            <a:r>
+              <a:rPr lang="de-DE" sz="1100" dirty="0" smtClean="0">
+                <a:hlinkClick r:id="rId14"/>
+              </a:rPr>
+              <a:t>github.com/nappydevelopment/docs/blob/master/pdfs/Test%20Plan.pdf</a:t>
+            </a:r>
+            <a:r>
+              <a:rPr lang="de-DE" sz="1100" dirty="0" smtClean="0"/>
+              <a:t> </a:t>
+            </a:r>
+          </a:p>
+          <a:p>
+            <a:r>
+              <a:rPr lang="de-DE" sz="1100" dirty="0" err="1" smtClean="0"/>
+              <a:t>Riskmanagement</a:t>
+            </a:r>
+            <a:r>
+              <a:rPr lang="de-DE" sz="1100" dirty="0"/>
+              <a:t> - </a:t>
+            </a:r>
+            <a:r>
+              <a:rPr lang="de-DE" sz="1100" dirty="0">
+                <a:hlinkClick r:id="rId15"/>
+              </a:rPr>
+              <a:t>https://</a:t>
+            </a:r>
+            <a:r>
+              <a:rPr lang="de-DE" sz="1100" dirty="0" smtClean="0">
+                <a:hlinkClick r:id="rId15"/>
+              </a:rPr>
+              <a:t>github.com/nappydevelopment/docs/blob/master/pdfs/Riskmanagment.pdf</a:t>
+            </a:r>
+            <a:r>
+              <a:rPr lang="de-DE" sz="1100" dirty="0" smtClean="0"/>
+              <a:t> </a:t>
+            </a:r>
+          </a:p>
+          <a:p>
+            <a:r>
+              <a:rPr lang="de-DE" sz="1100" dirty="0" err="1" smtClean="0"/>
+              <a:t>Function</a:t>
+            </a:r>
+            <a:r>
+              <a:rPr lang="de-DE" sz="1100" dirty="0" smtClean="0"/>
+              <a:t> </a:t>
+            </a:r>
+            <a:r>
+              <a:rPr lang="de-DE" sz="1100" dirty="0"/>
+              <a:t>Points - </a:t>
+            </a:r>
+            <a:r>
+              <a:rPr lang="de-DE" sz="1100" dirty="0">
+                <a:hlinkClick r:id="rId16"/>
+              </a:rPr>
+              <a:t>https://</a:t>
+            </a:r>
+            <a:r>
+              <a:rPr lang="de-DE" sz="1100" dirty="0" smtClean="0">
+                <a:hlinkClick r:id="rId16"/>
+              </a:rPr>
+              <a:t>github.com/nappydevelopment/docs/blob/master/pdfs/Usecase%20doc.pdf</a:t>
+            </a:r>
+            <a:endParaRPr lang="de-DE" sz="1100" dirty="0" smtClean="0"/>
+          </a:p>
+          <a:p>
+            <a:endParaRPr lang="de-DE" sz="1100" dirty="0" smtClean="0"/>
+          </a:p>
+          <a:p>
+            <a:endParaRPr lang="de-DE" sz="1100" dirty="0"/>
+          </a:p>
+        </p:txBody>
+      </p:sp>
+      <p:sp>
+        <p:nvSpPr>
+          <p:cNvPr id="5" name="Foliennummernplatzhalter 4"/>
+          <p:cNvSpPr>
+            <a:spLocks noGrp="1"/>
+          </p:cNvSpPr>
+          <p:nvPr>
+            <p:ph type="sldNum" sz="quarter" idx="12"/>
+          </p:nvPr>
+        </p:nvSpPr>
+        <p:spPr/>
+        <p:txBody>
+          <a:bodyPr/>
+          <a:lstStyle/>
+          <a:p>
+            <a:fld id="{BEA2534F-1EDD-48ED-BC5A-02D188FC5C63}" type="slidenum">
+              <a:rPr lang="de-DE" smtClean="0"/>
+              <a:t>29</a:t>
+            </a:fld>
+            <a:endParaRPr lang="de-DE" dirty="0"/>
+          </a:p>
+        </p:txBody>
+      </p:sp>
+    </p:spTree>
+    <p:extLst>
+      <p:ext uri="{BB962C8B-B14F-4D97-AF65-F5344CB8AC3E}">
+        <p14:creationId xmlns:p14="http://schemas.microsoft.com/office/powerpoint/2010/main" val="4156659667"/>
+      </p:ext>
+    </p:extLst>
+  </p:cSld>
+  <p:clrMapOvr>
+    <a:masterClrMapping/>
+  </p:clrMapOvr>
+  <p:timing>
+    <p:tnLst>
+      <p:par>
+        <p:cTn id="1" dur="indefinite" restart="never" nodeType="tmRoot"/>
+      </p:par>
+    </p:tnLst>
+  </p:timing>
+</p:sld>
+</file>
+
 <file path=ppt/slides/slide3.xml><?xml version="1.0" encoding="utf-8"?>
 <p:sld xmlns:a="http://schemas.openxmlformats.org/drawingml/2006/main" xmlns:r="http://schemas.openxmlformats.org/officeDocument/2006/relationships" xmlns:p="http://schemas.openxmlformats.org/presentationml/2006/main">
   <p:cSld>
@@ -11909,8 +12814,20 @@
                 <a:tableStyleId>{3B4B98B0-60AC-42C2-AFA5-B58CD77FA1E5}</a:tableStyleId>
               </a:tblPr>
               <a:tblGrid>
-                <a:gridCol w="4914900"/>
-                <a:gridCol w="4914900"/>
+                <a:gridCol w="4914900">
+                  <a:extLst>
+                    <a:ext uri="{9D8B030D-6E8A-4147-A177-3AD203B41FA5}">
+                      <a16:colId xmlns:a16="http://schemas.microsoft.com/office/drawing/2014/main" val="20000"/>
+                    </a:ext>
+                  </a:extLst>
+                </a:gridCol>
+                <a:gridCol w="4914900">
+                  <a:extLst>
+                    <a:ext uri="{9D8B030D-6E8A-4147-A177-3AD203B41FA5}">
+                      <a16:colId xmlns:a16="http://schemas.microsoft.com/office/drawing/2014/main" val="20001"/>
+                    </a:ext>
+                  </a:extLst>
+                </a:gridCol>
               </a:tblGrid>
               <a:tr h="391885">
                 <a:tc>
@@ -11977,6 +12894,11 @@
                   </a:txBody>
                   <a:tcPr marL="68580" marR="68580" marT="0" marB="0"/>
                 </a:tc>
+                <a:extLst>
+                  <a:ext uri="{0D108BD9-81ED-4DB2-BD59-A6C34878D82A}">
+                    <a16:rowId xmlns:a16="http://schemas.microsoft.com/office/drawing/2014/main" val="10000"/>
+                  </a:ext>
+                </a:extLst>
               </a:tr>
               <a:tr h="391885">
                 <a:tc>
@@ -12067,6 +12989,11 @@
                   </a:txBody>
                   <a:tcPr marL="68580" marR="68580" marT="0" marB="0"/>
                 </a:tc>
+                <a:extLst>
+                  <a:ext uri="{0D108BD9-81ED-4DB2-BD59-A6C34878D82A}">
+                    <a16:rowId xmlns:a16="http://schemas.microsoft.com/office/drawing/2014/main" val="10001"/>
+                  </a:ext>
+                </a:extLst>
               </a:tr>
               <a:tr h="391885">
                 <a:tc>
@@ -12128,6 +13055,11 @@
                   </a:txBody>
                   <a:tcPr marL="68580" marR="68580" marT="0" marB="0"/>
                 </a:tc>
+                <a:extLst>
+                  <a:ext uri="{0D108BD9-81ED-4DB2-BD59-A6C34878D82A}">
+                    <a16:rowId xmlns:a16="http://schemas.microsoft.com/office/drawing/2014/main" val="10002"/>
+                  </a:ext>
+                </a:extLst>
               </a:tr>
               <a:tr h="391885">
                 <a:tc>
@@ -12201,6 +13133,11 @@
                   </a:txBody>
                   <a:tcPr marL="68580" marR="68580" marT="0" marB="0"/>
                 </a:tc>
+                <a:extLst>
+                  <a:ext uri="{0D108BD9-81ED-4DB2-BD59-A6C34878D82A}">
+                    <a16:rowId xmlns:a16="http://schemas.microsoft.com/office/drawing/2014/main" val="10003"/>
+                  </a:ext>
+                </a:extLst>
               </a:tr>
               <a:tr h="391885">
                 <a:tc>
@@ -12262,6 +13199,11 @@
                   </a:txBody>
                   <a:tcPr marL="68580" marR="68580" marT="0" marB="0"/>
                 </a:tc>
+                <a:extLst>
+                  <a:ext uri="{0D108BD9-81ED-4DB2-BD59-A6C34878D82A}">
+                    <a16:rowId xmlns:a16="http://schemas.microsoft.com/office/drawing/2014/main" val="10004"/>
+                  </a:ext>
+                </a:extLst>
               </a:tr>
               <a:tr h="391885">
                 <a:tc>
@@ -12325,6 +13267,11 @@
                   </a:txBody>
                   <a:tcPr marL="68580" marR="68580" marT="0" marB="0"/>
                 </a:tc>
+                <a:extLst>
+                  <a:ext uri="{0D108BD9-81ED-4DB2-BD59-A6C34878D82A}">
+                    <a16:rowId xmlns:a16="http://schemas.microsoft.com/office/drawing/2014/main" val="10005"/>
+                  </a:ext>
+                </a:extLst>
               </a:tr>
               <a:tr h="391885">
                 <a:tc>
@@ -12400,6 +13347,11 @@
                   </a:txBody>
                   <a:tcPr marL="68580" marR="68580" marT="0" marB="0"/>
                 </a:tc>
+                <a:extLst>
+                  <a:ext uri="{0D108BD9-81ED-4DB2-BD59-A6C34878D82A}">
+                    <a16:rowId xmlns:a16="http://schemas.microsoft.com/office/drawing/2014/main" val="10006"/>
+                  </a:ext>
+                </a:extLst>
               </a:tr>
               <a:tr h="391885">
                 <a:tc>
@@ -12461,6 +13413,11 @@
                   </a:txBody>
                   <a:tcPr marL="68580" marR="68580" marT="0" marB="0"/>
                 </a:tc>
+                <a:extLst>
+                  <a:ext uri="{0D108BD9-81ED-4DB2-BD59-A6C34878D82A}">
+                    <a16:rowId xmlns:a16="http://schemas.microsoft.com/office/drawing/2014/main" val="10007"/>
+                  </a:ext>
+                </a:extLst>
               </a:tr>
               <a:tr h="391885">
                 <a:tc>
@@ -12543,6 +13500,11 @@
                   </a:txBody>
                   <a:tcPr marL="68580" marR="68580" marT="0" marB="0"/>
                 </a:tc>
+                <a:extLst>
+                  <a:ext uri="{0D108BD9-81ED-4DB2-BD59-A6C34878D82A}">
+                    <a16:rowId xmlns:a16="http://schemas.microsoft.com/office/drawing/2014/main" val="10008"/>
+                  </a:ext>
+                </a:extLst>
               </a:tr>
               <a:tr h="391885">
                 <a:tc>
@@ -12625,6 +13587,11 @@
                   </a:txBody>
                   <a:tcPr marL="68580" marR="68580" marT="0" marB="0"/>
                 </a:tc>
+                <a:extLst>
+                  <a:ext uri="{0D108BD9-81ED-4DB2-BD59-A6C34878D82A}">
+                    <a16:rowId xmlns:a16="http://schemas.microsoft.com/office/drawing/2014/main" val="10009"/>
+                  </a:ext>
+                </a:extLst>
               </a:tr>
             </a:tbl>
           </a:graphicData>
@@ -12657,6 +13624,43 @@
     <p:extLst>
       <p:ext uri="{BB962C8B-B14F-4D97-AF65-F5344CB8AC3E}">
         <p14:creationId xmlns:p14="http://schemas.microsoft.com/office/powerpoint/2010/main" val="3108508054"/>
+      </p:ext>
+    </p:extLst>
+  </p:cSld>
+  <p:clrMapOvr>
+    <a:masterClrMapping/>
+  </p:clrMapOvr>
+  <p:timing>
+    <p:tnLst>
+      <p:par>
+        <p:cTn id="1" dur="indefinite" restart="never" nodeType="tmRoot"/>
+      </p:par>
+    </p:tnLst>
+  </p:timing>
+</p:sld>
+</file>
+
+<file path=ppt/slides/slide30.xml><?xml version="1.0" encoding="utf-8"?>
+<p:sld xmlns:a="http://schemas.openxmlformats.org/drawingml/2006/main" xmlns:r="http://schemas.openxmlformats.org/officeDocument/2006/relationships" xmlns:p="http://schemas.openxmlformats.org/presentationml/2006/main">
+  <p:cSld>
+    <p:spTree>
+      <p:nvGrpSpPr>
+        <p:cNvPr id="1" name=""/>
+        <p:cNvGrpSpPr/>
+        <p:nvPr/>
+      </p:nvGrpSpPr>
+      <p:grpSpPr>
+        <a:xfrm>
+          <a:off x="0" y="0"/>
+          <a:ext cx="0" cy="0"/>
+          <a:chOff x="0" y="0"/>
+          <a:chExt cx="0" cy="0"/>
+        </a:xfrm>
+      </p:grpSpPr>
+    </p:spTree>
+    <p:extLst>
+      <p:ext uri="{BB962C8B-B14F-4D97-AF65-F5344CB8AC3E}">
+        <p14:creationId xmlns:p14="http://schemas.microsoft.com/office/powerpoint/2010/main" val="1963750634"/>
       </p:ext>
     </p:extLst>
   </p:cSld>
@@ -13893,6 +14897,36 @@
           </a:p>
         </p:txBody>
       </p:sp>
+      <p:pic>
+        <p:nvPicPr>
+          <p:cNvPr id="8" name="Grafik 7"/>
+          <p:cNvPicPr>
+            <a:picLocks noChangeAspect="1"/>
+          </p:cNvPicPr>
+          <p:nvPr/>
+        </p:nvPicPr>
+        <p:blipFill>
+          <a:blip r:embed="rId4">
+            <a:extLst>
+              <a:ext uri="{28A0092B-C50C-407E-A947-70E740481C1C}">
+                <a14:useLocalDpi xmlns:a14="http://schemas.microsoft.com/office/drawing/2010/main" val="0"/>
+              </a:ext>
+            </a:extLst>
+          </a:blip>
+          <a:stretch>
+            <a:fillRect/>
+          </a:stretch>
+        </p:blipFill>
+        <p:spPr>
+          <a:xfrm>
+            <a:off x="-3992563" y="-18576"/>
+            <a:ext cx="3944938" cy="6858000"/>
+          </a:xfrm>
+          <a:prstGeom prst="rect">
+            <a:avLst/>
+          </a:prstGeom>
+        </p:spPr>
+      </p:pic>
     </p:spTree>
     <p:extLst>
       <p:ext uri="{BB962C8B-B14F-4D97-AF65-F5344CB8AC3E}">
@@ -13906,7 +14940,70 @@
   <p:timing>
     <p:tnLst>
       <p:par>
-        <p:cTn id="1" dur="indefinite" restart="never" nodeType="tmRoot"/>
+        <p:cTn id="1" dur="indefinite" restart="never" nodeType="tmRoot">
+          <p:childTnLst>
+            <p:seq concurrent="1" nextAc="seek">
+              <p:cTn id="2" dur="indefinite" nodeType="mainSeq">
+                <p:childTnLst>
+                  <p:par>
+                    <p:cTn id="3" fill="hold">
+                      <p:stCondLst>
+                        <p:cond delay="indefinite"/>
+                      </p:stCondLst>
+                      <p:childTnLst>
+                        <p:par>
+                          <p:cTn id="4" fill="hold">
+                            <p:stCondLst>
+                              <p:cond delay="0"/>
+                            </p:stCondLst>
+                            <p:childTnLst>
+                              <p:par>
+                                <p:cTn id="5" presetID="42" presetClass="path" presetSubtype="0" accel="50000" decel="50000" fill="hold" nodeType="clickEffect">
+                                  <p:stCondLst>
+                                    <p:cond delay="0"/>
+                                  </p:stCondLst>
+                                  <p:childTnLst>
+                                    <p:animMotion origin="layout" path="M -5E-6 -2.22222E-6 L 1.32995 -0.00208 " pathEditMode="relative" rAng="0" ptsTypes="AA">
+                                      <p:cBhvr>
+                                        <p:cTn id="6" dur="1000" fill="hold"/>
+                                        <p:tgtEl>
+                                          <p:spTgt spid="8"/>
+                                        </p:tgtEl>
+                                        <p:attrNameLst>
+                                          <p:attrName>ppt_x</p:attrName>
+                                          <p:attrName>ppt_y</p:attrName>
+                                        </p:attrNameLst>
+                                      </p:cBhvr>
+                                      <p:rCtr x="66497" y="-116"/>
+                                    </p:animMotion>
+                                  </p:childTnLst>
+                                </p:cTn>
+                              </p:par>
+                            </p:childTnLst>
+                          </p:cTn>
+                        </p:par>
+                      </p:childTnLst>
+                    </p:cTn>
+                  </p:par>
+                </p:childTnLst>
+              </p:cTn>
+              <p:prevCondLst>
+                <p:cond evt="onPrev" delay="0">
+                  <p:tgtEl>
+                    <p:sldTgt/>
+                  </p:tgtEl>
+                </p:cond>
+              </p:prevCondLst>
+              <p:nextCondLst>
+                <p:cond evt="onNext" delay="0">
+                  <p:tgtEl>
+                    <p:sldTgt/>
+                  </p:tgtEl>
+                </p:cond>
+              </p:nextCondLst>
+            </p:seq>
+          </p:childTnLst>
+        </p:cTn>
       </p:par>
     </p:tnLst>
   </p:timing>
@@ -14183,7 +15280,17 @@
                   </a:schemeClr>
                 </a:solidFill>
               </a:rPr>
-              <a:t>PROJECT METHODOLOGY</a:t>
+              <a:t>PROJECT </a:t>
+            </a:r>
+            <a:r>
+              <a:rPr lang="de-DE" sz="4800" dirty="0" smtClean="0">
+                <a:solidFill>
+                  <a:schemeClr val="bg1">
+                    <a:lumMod val="50000"/>
+                  </a:schemeClr>
+                </a:solidFill>
+              </a:rPr>
+              <a:t>MANAGEMENT</a:t>
             </a:r>
             <a:endParaRPr lang="de-DE" sz="4800" dirty="0"/>
           </a:p>
@@ -14711,7 +15818,7 @@
   <a:extraClrSchemeLst/>
   <a:extLst>
     <a:ext uri="{05A4C25C-085E-4340-85A3-A5531E510DB2}">
-      <thm15:themeFamily xmlns="" xmlns:thm15="http://schemas.microsoft.com/office/thememl/2012/main" name="Retrospect" id="{5F128B03-DCCA-4EEB-AB3B-CF2899314A46}" vid="{3F1AAB62-24C6-49D2-8E01-B56FAC9A3DCD}"/>
+      <thm15:themeFamily xmlns:thm15="http://schemas.microsoft.com/office/thememl/2012/main" name="Retrospect" id="{5F128B03-DCCA-4EEB-AB3B-CF2899314A46}" vid="{3F1AAB62-24C6-49D2-8E01-B56FAC9A3DCD}"/>
     </a:ext>
   </a:extLst>
 </a:theme>
@@ -14972,7 +16079,7 @@
   <a:extraClrSchemeLst/>
   <a:extLst>
     <a:ext uri="{05A4C25C-085E-4340-85A3-A5531E510DB2}">
-      <thm15:themeFamily xmlns="" xmlns:thm15="http://schemas.microsoft.com/office/thememl/2012/main" name="Office Theme" id="{62F939B6-93AF-4DB8-9C6B-D6C7DFDC589F}" vid="{4A3C46E8-61CC-4603-A589-7422A47A8E4A}"/>
+      <thm15:themeFamily xmlns:thm15="http://schemas.microsoft.com/office/thememl/2012/main" name="Office Theme" id="{62F939B6-93AF-4DB8-9C6B-D6C7DFDC589F}" vid="{4A3C46E8-61CC-4603-A589-7422A47A8E4A}"/>
     </a:ext>
   </a:extLst>
 </a:theme>

</xml_diff>